<commit_message>
Updating thumbnails and old slides
</commit_message>
<xml_diff>
--- a/2025/20250201-GeometryIsEntropy.pptx
+++ b/2025/20250201-GeometryIsEntropy.pptx
@@ -215,7 +215,7 @@
           <a:p>
             <a:fld id="{E119C704-B8F9-449B-B828-36D786A1FE73}" type="datetimeFigureOut">
               <a:rPr lang="en-US" smtClean="0"/>
-              <a:t>1/20/2025</a:t>
+              <a:t>1/26/2025</a:t>
             </a:fld>
             <a:endParaRPr lang="en-US"/>
           </a:p>
@@ -526,7 +526,45 @@
           <a:bodyPr/>
           <a:lstStyle/>
           <a:p>
+            <a:r>
+              <a:rPr lang="en-US" dirty="0"/>
+              <a:t>In this video I will show you the fundamental connection between the geometry of states and entropy. If you studied thermodynamics, you already have a sense that volumes in physical space are connected to entropy. Both volume and entropy are extensive quantities, so if you take two equal volumes of the same gas, you have double the size but also double the entropy. So you can use the volume to measure the entropy, but you can also use the entropy to measure the volume. Something similar, but much deeper, happens for state spaces. The state spaces of both classical and quantum mechanics have a geometric structure that allows you to define Hamiltonians or </a:t>
+            </a:r>
+            <a:r>
+              <a:rPr lang="en-US" dirty="0" err="1"/>
+              <a:t>Lagrangians</a:t>
+            </a:r>
+            <a:r>
+              <a:rPr lang="en-US" dirty="0"/>
+              <a:t> and get the equations of motion. What happens is that the same geometrical structures allows you to calculate the entropy for classical and quantum ensembles in statistical mechanics. Nothing new so far. However, and here is the kicker: you can go back. If don’t give you the geometric structure, but I gave you the entropy for all the ensembles, you can recover the geometric structure. Therefore the geometric structure and the entropic structure are the same thing. Geometry is entropy, entropy is geometry.</a:t>
+            </a:r>
+          </a:p>
+          <a:p>
             <a:endParaRPr lang="en-US" dirty="0"/>
+          </a:p>
+          <a:p>
+            <a:r>
+              <a:rPr lang="en-US" dirty="0"/>
+              <a:t>At an intuitive level, the geometry of states defines sizes in terms of number of states and number of configurations. Entropy quantifies the variability of states, of configurations, within an ensemble. That is, an ensemble is the set of all possible preparations of an identical prepared system. The entropy tells you how much variability is there among those preparations. How different are from each other. Therefore it makes sense that being able to quantify the variability among states and quantifying the number of states… well, they are the same thing.</a:t>
+            </a:r>
+          </a:p>
+          <a:p>
+            <a:endParaRPr lang="en-US" dirty="0"/>
+          </a:p>
+          <a:p>
+            <a:r>
+              <a:rPr lang="en-US" dirty="0"/>
+              <a:t>This link tells you that the general perspective that statistical mechanics is built ON TOP of mechanics is actually wrong. In fact, you can start by doing statistical mechanics and recover standard mechanics as the limit case. Basically: standard mechanics and statistical mechanics are the same thing. You cannot define one without implicitly defining the other.</a:t>
+            </a:r>
+          </a:p>
+          <a:p>
+            <a:endParaRPr lang="en-US" dirty="0"/>
+          </a:p>
+          <a:p>
+            <a:r>
+              <a:rPr lang="en-US" dirty="0"/>
+              <a:t>But this is all words! As usual, you should not take my word for it. So, let’s look at the details, like we always do… It keeps us honest.</a:t>
+            </a:r>
           </a:p>
         </p:txBody>
       </p:sp>
@@ -713,7 +751,7 @@
           <a:p>
             <a:fld id="{DBFECF9E-8B09-4099-B1BA-6ADDA94A0342}" type="datetime1">
               <a:rPr lang="en-US" smtClean="0"/>
-              <a:t>1/20/2025</a:t>
+              <a:t>1/26/2025</a:t>
             </a:fld>
             <a:endParaRPr lang="en-US"/>
           </a:p>
@@ -1217,7 +1255,7 @@
           <a:p>
             <a:fld id="{C2E4689B-730B-4AF6-A7AC-5BF745BF6CF6}" type="datetime1">
               <a:rPr lang="en-US" smtClean="0"/>
-              <a:t>1/20/2025</a:t>
+              <a:t>1/26/2025</a:t>
             </a:fld>
             <a:endParaRPr lang="en-US"/>
           </a:p>
@@ -1428,7 +1466,7 @@
           <a:p>
             <a:fld id="{849CD730-13C7-4BA8-9C49-4344F22DB36C}" type="datetime1">
               <a:rPr lang="en-US" smtClean="0"/>
-              <a:t>1/20/2025</a:t>
+              <a:t>1/26/2025</a:t>
             </a:fld>
             <a:endParaRPr lang="en-US"/>
           </a:p>
@@ -1657,7 +1695,7 @@
           <a:p>
             <a:fld id="{14040F82-CAAF-492E-A3B6-9D23E7AB0A58}" type="datetime1">
               <a:rPr lang="en-US" smtClean="0"/>
-              <a:t>1/20/2025</a:t>
+              <a:t>1/26/2025</a:t>
             </a:fld>
             <a:endParaRPr lang="en-US" dirty="0"/>
           </a:p>
@@ -1907,7 +1945,7 @@
           <a:p>
             <a:fld id="{5E94585C-5462-4635-A827-CBBCD3A2E6B8}" type="datetime1">
               <a:rPr lang="en-US" smtClean="0"/>
-              <a:t>1/20/2025</a:t>
+              <a:t>1/26/2025</a:t>
             </a:fld>
             <a:endParaRPr lang="en-US"/>
           </a:p>
@@ -2175,7 +2213,7 @@
           <a:p>
             <a:fld id="{B09B1218-991B-4184-B0F8-198D0FAC17F9}" type="datetime1">
               <a:rPr lang="en-US" smtClean="0"/>
-              <a:t>1/20/2025</a:t>
+              <a:t>1/26/2025</a:t>
             </a:fld>
             <a:endParaRPr lang="en-US"/>
           </a:p>
@@ -2590,7 +2628,7 @@
           <a:p>
             <a:fld id="{9555B3F8-63BD-45A8-8D64-7C6391B4DEC4}" type="datetime1">
               <a:rPr lang="en-US" smtClean="0"/>
-              <a:t>1/20/2025</a:t>
+              <a:t>1/26/2025</a:t>
             </a:fld>
             <a:endParaRPr lang="en-US"/>
           </a:p>
@@ -2734,7 +2772,7 @@
           <a:p>
             <a:fld id="{B6287A86-4DED-4531-AD0C-FE6F48B43375}" type="datetime1">
               <a:rPr lang="en-US" smtClean="0"/>
-              <a:t>1/20/2025</a:t>
+              <a:t>1/26/2025</a:t>
             </a:fld>
             <a:endParaRPr lang="en-US"/>
           </a:p>
@@ -2850,7 +2888,7 @@
           <a:p>
             <a:fld id="{2BB7EE58-DC87-4D11-AA22-E3A6718A2E80}" type="datetime1">
               <a:rPr lang="en-US" smtClean="0"/>
-              <a:t>1/20/2025</a:t>
+              <a:t>1/26/2025</a:t>
             </a:fld>
             <a:endParaRPr lang="en-US" dirty="0"/>
           </a:p>
@@ -3165,7 +3203,7 @@
           <a:p>
             <a:fld id="{F681BEE4-EED9-4644-8E5D-BAF3D04BB52D}" type="datetime1">
               <a:rPr lang="en-US" smtClean="0"/>
-              <a:t>1/20/2025</a:t>
+              <a:t>1/26/2025</a:t>
             </a:fld>
             <a:endParaRPr lang="en-US"/>
           </a:p>
@@ -3456,7 +3494,7 @@
           <a:p>
             <a:fld id="{6E9AAFE7-E238-4DAA-A26B-A60C405FBFD6}" type="datetime1">
               <a:rPr lang="en-US" smtClean="0"/>
-              <a:t>1/20/2025</a:t>
+              <a:t>1/26/2025</a:t>
             </a:fld>
             <a:endParaRPr lang="en-US"/>
           </a:p>
@@ -3700,7 +3738,7 @@
           <a:p>
             <a:fld id="{F865660A-2FFB-4EA8-A917-E41016B95ABA}" type="datetime1">
               <a:rPr lang="en-US" smtClean="0"/>
-              <a:t>1/20/2025</a:t>
+              <a:t>1/26/2025</a:t>
             </a:fld>
             <a:endParaRPr lang="en-US" dirty="0"/>
           </a:p>
@@ -7267,8 +7305,8 @@
           </p:sp>
         </mc:Fallback>
       </mc:AlternateContent>
-      <mc:AlternateContent xmlns:mc="http://schemas.openxmlformats.org/markup-compatibility/2006">
-        <mc:Choice xmlns:a14="http://schemas.microsoft.com/office/drawing/2010/main" Requires="a14">
+      <mc:AlternateContent xmlns:mc="http://schemas.openxmlformats.org/markup-compatibility/2006" xmlns:a14="http://schemas.microsoft.com/office/drawing/2010/main">
+        <mc:Choice Requires="a14">
           <p:sp>
             <p:nvSpPr>
               <p:cNvPr id="14" name="TextBox 13">
@@ -7318,7 +7356,7 @@
             </p:txBody>
           </p:sp>
         </mc:Choice>
-        <mc:Fallback>
+        <mc:Fallback xmlns="">
           <p:sp>
             <p:nvSpPr>
               <p:cNvPr id="14" name="TextBox 13">
@@ -7363,8 +7401,8 @@
           </p:sp>
         </mc:Fallback>
       </mc:AlternateContent>
-      <mc:AlternateContent xmlns:mc="http://schemas.openxmlformats.org/markup-compatibility/2006">
-        <mc:Choice xmlns:a14="http://schemas.microsoft.com/office/drawing/2010/main" Requires="a14">
+      <mc:AlternateContent xmlns:mc="http://schemas.openxmlformats.org/markup-compatibility/2006" xmlns:a14="http://schemas.microsoft.com/office/drawing/2010/main">
+        <mc:Choice Requires="a14">
           <p:sp>
             <p:nvSpPr>
               <p:cNvPr id="15" name="TextBox 14">
@@ -7414,7 +7452,7 @@
             </p:txBody>
           </p:sp>
         </mc:Choice>
-        <mc:Fallback>
+        <mc:Fallback xmlns="">
           <p:sp>
             <p:nvSpPr>
               <p:cNvPr id="15" name="TextBox 14">
@@ -8337,8 +8375,8 @@
           </p:sp>
         </mc:Fallback>
       </mc:AlternateContent>
-      <mc:AlternateContent xmlns:mc="http://schemas.openxmlformats.org/markup-compatibility/2006">
-        <mc:Choice xmlns:a14="http://schemas.microsoft.com/office/drawing/2010/main" Requires="a14">
+      <mc:AlternateContent xmlns:mc="http://schemas.openxmlformats.org/markup-compatibility/2006" xmlns:a14="http://schemas.microsoft.com/office/drawing/2010/main">
+        <mc:Choice Requires="a14">
           <p:sp>
             <p:nvSpPr>
               <p:cNvPr id="14" name="TextBox 13">
@@ -8388,7 +8426,7 @@
             </p:txBody>
           </p:sp>
         </mc:Choice>
-        <mc:Fallback>
+        <mc:Fallback xmlns="">
           <p:sp>
             <p:nvSpPr>
               <p:cNvPr id="14" name="TextBox 13">
@@ -8433,8 +8471,8 @@
           </p:sp>
         </mc:Fallback>
       </mc:AlternateContent>
-      <mc:AlternateContent xmlns:mc="http://schemas.openxmlformats.org/markup-compatibility/2006">
-        <mc:Choice xmlns:a14="http://schemas.microsoft.com/office/drawing/2010/main" Requires="a14">
+      <mc:AlternateContent xmlns:mc="http://schemas.openxmlformats.org/markup-compatibility/2006" xmlns:a14="http://schemas.microsoft.com/office/drawing/2010/main">
+        <mc:Choice Requires="a14">
           <p:sp>
             <p:nvSpPr>
               <p:cNvPr id="15" name="TextBox 14">
@@ -8484,7 +8522,7 @@
             </p:txBody>
           </p:sp>
         </mc:Choice>
-        <mc:Fallback>
+        <mc:Fallback xmlns="">
           <p:sp>
             <p:nvSpPr>
               <p:cNvPr id="15" name="TextBox 14">
@@ -8625,8 +8663,8 @@
           </p:sp>
         </mc:Fallback>
       </mc:AlternateContent>
-      <mc:AlternateContent xmlns:mc="http://schemas.openxmlformats.org/markup-compatibility/2006">
-        <mc:Choice xmlns:a14="http://schemas.microsoft.com/office/drawing/2010/main" Requires="a14">
+      <mc:AlternateContent xmlns:mc="http://schemas.openxmlformats.org/markup-compatibility/2006" xmlns:a14="http://schemas.microsoft.com/office/drawing/2010/main">
+        <mc:Choice Requires="a14">
           <p:sp>
             <p:nvSpPr>
               <p:cNvPr id="3" name="TextBox 2">
@@ -8874,7 +8912,7 @@
             </p:txBody>
           </p:sp>
         </mc:Choice>
-        <mc:Fallback>
+        <mc:Fallback xmlns="">
           <p:sp>
             <p:nvSpPr>
               <p:cNvPr id="3" name="TextBox 2">
@@ -9037,8 +9075,8 @@
           </p:sp>
         </mc:Fallback>
       </mc:AlternateContent>
-      <mc:AlternateContent xmlns:mc="http://schemas.openxmlformats.org/markup-compatibility/2006">
-        <mc:Choice xmlns:a14="http://schemas.microsoft.com/office/drawing/2010/main" Requires="a14">
+      <mc:AlternateContent xmlns:mc="http://schemas.openxmlformats.org/markup-compatibility/2006" xmlns:a14="http://schemas.microsoft.com/office/drawing/2010/main">
+        <mc:Choice Requires="a14">
           <p:sp>
             <p:nvSpPr>
               <p:cNvPr id="10" name="TextBox 9">
@@ -9125,7 +9163,7 @@
             </p:txBody>
           </p:sp>
         </mc:Choice>
-        <mc:Fallback>
+        <mc:Fallback xmlns="">
           <p:sp>
             <p:nvSpPr>
               <p:cNvPr id="10" name="TextBox 9">
@@ -9170,8 +9208,8 @@
           </p:sp>
         </mc:Fallback>
       </mc:AlternateContent>
-      <mc:AlternateContent xmlns:mc="http://schemas.openxmlformats.org/markup-compatibility/2006">
-        <mc:Choice xmlns:a14="http://schemas.microsoft.com/office/drawing/2010/main" Requires="a14">
+      <mc:AlternateContent xmlns:mc="http://schemas.openxmlformats.org/markup-compatibility/2006" xmlns:a14="http://schemas.microsoft.com/office/drawing/2010/main">
+        <mc:Choice Requires="a14">
           <p:sp>
             <p:nvSpPr>
               <p:cNvPr id="11" name="TextBox 10">
@@ -9351,7 +9389,7 @@
             </p:txBody>
           </p:sp>
         </mc:Choice>
-        <mc:Fallback>
+        <mc:Fallback xmlns="">
           <p:sp>
             <p:nvSpPr>
               <p:cNvPr id="11" name="TextBox 10">
@@ -9923,8 +9961,8 @@
           </p:sp>
         </mc:Fallback>
       </mc:AlternateContent>
-      <mc:AlternateContent xmlns:mc="http://schemas.openxmlformats.org/markup-compatibility/2006">
-        <mc:Choice xmlns:a14="http://schemas.microsoft.com/office/drawing/2010/main" Requires="a14">
+      <mc:AlternateContent xmlns:mc="http://schemas.openxmlformats.org/markup-compatibility/2006" xmlns:a14="http://schemas.microsoft.com/office/drawing/2010/main">
+        <mc:Choice Requires="a14">
           <p:sp>
             <p:nvSpPr>
               <p:cNvPr id="14" name="TextBox 13">
@@ -9974,7 +10012,7 @@
             </p:txBody>
           </p:sp>
         </mc:Choice>
-        <mc:Fallback>
+        <mc:Fallback xmlns="">
           <p:sp>
             <p:nvSpPr>
               <p:cNvPr id="14" name="TextBox 13">
@@ -10115,8 +10153,8 @@
           </p:sp>
         </mc:Fallback>
       </mc:AlternateContent>
-      <mc:AlternateContent xmlns:mc="http://schemas.openxmlformats.org/markup-compatibility/2006">
-        <mc:Choice xmlns:a14="http://schemas.microsoft.com/office/drawing/2010/main" Requires="a14">
+      <mc:AlternateContent xmlns:mc="http://schemas.openxmlformats.org/markup-compatibility/2006" xmlns:a14="http://schemas.microsoft.com/office/drawing/2010/main">
+        <mc:Choice Requires="a14">
           <p:sp>
             <p:nvSpPr>
               <p:cNvPr id="3" name="TextBox 2">
@@ -10364,7 +10402,7 @@
             </p:txBody>
           </p:sp>
         </mc:Choice>
-        <mc:Fallback>
+        <mc:Fallback xmlns="">
           <p:sp>
             <p:nvSpPr>
               <p:cNvPr id="3" name="TextBox 2">
@@ -10505,8 +10543,8 @@
           </p:sp>
         </mc:Fallback>
       </mc:AlternateContent>
-      <mc:AlternateContent xmlns:mc="http://schemas.openxmlformats.org/markup-compatibility/2006">
-        <mc:Choice xmlns:a14="http://schemas.microsoft.com/office/drawing/2010/main" Requires="a14">
+      <mc:AlternateContent xmlns:mc="http://schemas.openxmlformats.org/markup-compatibility/2006" xmlns:a14="http://schemas.microsoft.com/office/drawing/2010/main">
+        <mc:Choice Requires="a14">
           <p:sp>
             <p:nvSpPr>
               <p:cNvPr id="5" name="TextBox 4">
@@ -10736,7 +10774,7 @@
             </p:txBody>
           </p:sp>
         </mc:Choice>
-        <mc:Fallback>
+        <mc:Fallback xmlns="">
           <p:sp>
             <p:nvSpPr>
               <p:cNvPr id="5" name="TextBox 4">
@@ -10781,8 +10819,8 @@
           </p:sp>
         </mc:Fallback>
       </mc:AlternateContent>
-      <mc:AlternateContent xmlns:mc="http://schemas.openxmlformats.org/markup-compatibility/2006">
-        <mc:Choice xmlns:a14="http://schemas.microsoft.com/office/drawing/2010/main" Requires="a14">
+      <mc:AlternateContent xmlns:mc="http://schemas.openxmlformats.org/markup-compatibility/2006" xmlns:a14="http://schemas.microsoft.com/office/drawing/2010/main">
+        <mc:Choice Requires="a14">
           <p:sp>
             <p:nvSpPr>
               <p:cNvPr id="17" name="TextBox 16">
@@ -11027,7 +11065,7 @@
             </p:txBody>
           </p:sp>
         </mc:Choice>
-        <mc:Fallback>
+        <mc:Fallback xmlns="">
           <p:sp>
             <p:nvSpPr>
               <p:cNvPr id="17" name="TextBox 16">
@@ -11072,8 +11110,8 @@
           </p:sp>
         </mc:Fallback>
       </mc:AlternateContent>
-      <mc:AlternateContent xmlns:mc="http://schemas.openxmlformats.org/markup-compatibility/2006">
-        <mc:Choice xmlns:a14="http://schemas.microsoft.com/office/drawing/2010/main" Requires="a14">
+      <mc:AlternateContent xmlns:mc="http://schemas.openxmlformats.org/markup-compatibility/2006" xmlns:a14="http://schemas.microsoft.com/office/drawing/2010/main">
+        <mc:Choice Requires="a14">
           <p:sp>
             <p:nvSpPr>
               <p:cNvPr id="18" name="TextBox 17">
@@ -11123,7 +11161,7 @@
             </p:txBody>
           </p:sp>
         </mc:Choice>
-        <mc:Fallback>
+        <mc:Fallback xmlns="">
           <p:sp>
             <p:nvSpPr>
               <p:cNvPr id="18" name="TextBox 17">
@@ -11168,8 +11206,8 @@
           </p:sp>
         </mc:Fallback>
       </mc:AlternateContent>
-      <mc:AlternateContent xmlns:mc="http://schemas.openxmlformats.org/markup-compatibility/2006">
-        <mc:Choice xmlns:a14="http://schemas.microsoft.com/office/drawing/2010/main" Requires="a14">
+      <mc:AlternateContent xmlns:mc="http://schemas.openxmlformats.org/markup-compatibility/2006" xmlns:a14="http://schemas.microsoft.com/office/drawing/2010/main">
+        <mc:Choice Requires="a14">
           <p:sp>
             <p:nvSpPr>
               <p:cNvPr id="20" name="TextBox 19">
@@ -11437,7 +11475,7 @@
             </p:txBody>
           </p:sp>
         </mc:Choice>
-        <mc:Fallback>
+        <mc:Fallback xmlns="">
           <p:sp>
             <p:nvSpPr>
               <p:cNvPr id="20" name="TextBox 19">
@@ -11913,8 +11951,8 @@
           </p:sp>
         </mc:Fallback>
       </mc:AlternateContent>
-      <mc:AlternateContent xmlns:mc="http://schemas.openxmlformats.org/markup-compatibility/2006">
-        <mc:Choice xmlns:a14="http://schemas.microsoft.com/office/drawing/2010/main" Requires="a14">
+      <mc:AlternateContent xmlns:mc="http://schemas.openxmlformats.org/markup-compatibility/2006" xmlns:a14="http://schemas.microsoft.com/office/drawing/2010/main">
+        <mc:Choice Requires="a14">
           <p:sp>
             <p:nvSpPr>
               <p:cNvPr id="14" name="TextBox 13">
@@ -11964,7 +12002,7 @@
             </p:txBody>
           </p:sp>
         </mc:Choice>
-        <mc:Fallback>
+        <mc:Fallback xmlns="">
           <p:sp>
             <p:nvSpPr>
               <p:cNvPr id="14" name="TextBox 13">
@@ -12201,8 +12239,8 @@
           </p:sp>
         </mc:Fallback>
       </mc:AlternateContent>
-      <mc:AlternateContent xmlns:mc="http://schemas.openxmlformats.org/markup-compatibility/2006">
-        <mc:Choice xmlns:a14="http://schemas.microsoft.com/office/drawing/2010/main" Requires="a14">
+      <mc:AlternateContent xmlns:mc="http://schemas.openxmlformats.org/markup-compatibility/2006" xmlns:a14="http://schemas.microsoft.com/office/drawing/2010/main">
+        <mc:Choice Requires="a14">
           <p:sp>
             <p:nvSpPr>
               <p:cNvPr id="18" name="TextBox 17">
@@ -12252,7 +12290,7 @@
             </p:txBody>
           </p:sp>
         </mc:Choice>
-        <mc:Fallback>
+        <mc:Fallback xmlns="">
           <p:sp>
             <p:nvSpPr>
               <p:cNvPr id="18" name="TextBox 17">
@@ -12297,8 +12335,8 @@
           </p:sp>
         </mc:Fallback>
       </mc:AlternateContent>
-      <mc:AlternateContent xmlns:mc="http://schemas.openxmlformats.org/markup-compatibility/2006">
-        <mc:Choice xmlns:a14="http://schemas.microsoft.com/office/drawing/2010/main" Requires="a14">
+      <mc:AlternateContent xmlns:mc="http://schemas.openxmlformats.org/markup-compatibility/2006" xmlns:a14="http://schemas.microsoft.com/office/drawing/2010/main">
+        <mc:Choice Requires="a14">
           <p:sp>
             <p:nvSpPr>
               <p:cNvPr id="20" name="TextBox 19">
@@ -12566,7 +12604,7 @@
             </p:txBody>
           </p:sp>
         </mc:Choice>
-        <mc:Fallback>
+        <mc:Fallback xmlns="">
           <p:sp>
             <p:nvSpPr>
               <p:cNvPr id="20" name="TextBox 19">
@@ -14484,8 +14522,8 @@
           </p:sp>
         </mc:Fallback>
       </mc:AlternateContent>
-      <mc:AlternateContent xmlns:mc="http://schemas.openxmlformats.org/markup-compatibility/2006">
-        <mc:Choice xmlns:a14="http://schemas.microsoft.com/office/drawing/2010/main" Requires="a14">
+      <mc:AlternateContent xmlns:mc="http://schemas.openxmlformats.org/markup-compatibility/2006" xmlns:a14="http://schemas.microsoft.com/office/drawing/2010/main">
+        <mc:Choice Requires="a14">
           <p:sp>
             <p:nvSpPr>
               <p:cNvPr id="2" name="TextBox 1">
@@ -14554,7 +14592,7 @@
             </p:txBody>
           </p:sp>
         </mc:Choice>
-        <mc:Fallback>
+        <mc:Fallback xmlns="">
           <p:sp>
             <p:nvSpPr>
               <p:cNvPr id="2" name="TextBox 1">
@@ -15929,352 +15967,6 @@
   <p:clrMapOvr>
     <a:masterClrMapping/>
   </p:clrMapOvr>
-  <p:timing>
-    <p:tnLst>
-      <p:par>
-        <p:cTn id="1" dur="indefinite" restart="never" nodeType="tmRoot">
-          <p:childTnLst>
-            <p:seq concurrent="1" nextAc="seek">
-              <p:cTn id="2" dur="indefinite" nodeType="mainSeq">
-                <p:childTnLst>
-                  <p:par>
-                    <p:cTn id="3" fill="hold">
-                      <p:stCondLst>
-                        <p:cond delay="indefinite"/>
-                      </p:stCondLst>
-                      <p:childTnLst>
-                        <p:par>
-                          <p:cTn id="4" fill="hold">
-                            <p:stCondLst>
-                              <p:cond delay="0"/>
-                            </p:stCondLst>
-                            <p:childTnLst>
-                              <p:par>
-                                <p:cTn id="5" presetID="1" presetClass="entr" presetSubtype="0" fill="hold" grpId="0" nodeType="clickEffect">
-                                  <p:stCondLst>
-                                    <p:cond delay="0"/>
-                                  </p:stCondLst>
-                                  <p:childTnLst>
-                                    <p:set>
-                                      <p:cBhvr>
-                                        <p:cTn id="6" dur="1" fill="hold">
-                                          <p:stCondLst>
-                                            <p:cond delay="0"/>
-                                          </p:stCondLst>
-                                        </p:cTn>
-                                        <p:tgtEl>
-                                          <p:spTgt spid="4"/>
-                                        </p:tgtEl>
-                                        <p:attrNameLst>
-                                          <p:attrName>style.visibility</p:attrName>
-                                        </p:attrNameLst>
-                                      </p:cBhvr>
-                                      <p:to>
-                                        <p:strVal val="visible"/>
-                                      </p:to>
-                                    </p:set>
-                                  </p:childTnLst>
-                                </p:cTn>
-                              </p:par>
-                              <p:par>
-                                <p:cTn id="7" presetID="1" presetClass="entr" presetSubtype="0" fill="hold" grpId="0" nodeType="withEffect">
-                                  <p:stCondLst>
-                                    <p:cond delay="0"/>
-                                  </p:stCondLst>
-                                  <p:childTnLst>
-                                    <p:set>
-                                      <p:cBhvr>
-                                        <p:cTn id="8" dur="1" fill="hold">
-                                          <p:stCondLst>
-                                            <p:cond delay="0"/>
-                                          </p:stCondLst>
-                                        </p:cTn>
-                                        <p:tgtEl>
-                                          <p:spTgt spid="5"/>
-                                        </p:tgtEl>
-                                        <p:attrNameLst>
-                                          <p:attrName>style.visibility</p:attrName>
-                                        </p:attrNameLst>
-                                      </p:cBhvr>
-                                      <p:to>
-                                        <p:strVal val="visible"/>
-                                      </p:to>
-                                    </p:set>
-                                  </p:childTnLst>
-                                </p:cTn>
-                              </p:par>
-                            </p:childTnLst>
-                          </p:cTn>
-                        </p:par>
-                      </p:childTnLst>
-                    </p:cTn>
-                  </p:par>
-                  <p:par>
-                    <p:cTn id="9" fill="hold">
-                      <p:stCondLst>
-                        <p:cond delay="indefinite"/>
-                      </p:stCondLst>
-                      <p:childTnLst>
-                        <p:par>
-                          <p:cTn id="10" fill="hold">
-                            <p:stCondLst>
-                              <p:cond delay="0"/>
-                            </p:stCondLst>
-                            <p:childTnLst>
-                              <p:par>
-                                <p:cTn id="11" presetID="1" presetClass="entr" presetSubtype="0" fill="hold" grpId="0" nodeType="clickEffect">
-                                  <p:stCondLst>
-                                    <p:cond delay="0"/>
-                                  </p:stCondLst>
-                                  <p:childTnLst>
-                                    <p:set>
-                                      <p:cBhvr>
-                                        <p:cTn id="12" dur="1" fill="hold">
-                                          <p:stCondLst>
-                                            <p:cond delay="0"/>
-                                          </p:stCondLst>
-                                        </p:cTn>
-                                        <p:tgtEl>
-                                          <p:spTgt spid="8"/>
-                                        </p:tgtEl>
-                                        <p:attrNameLst>
-                                          <p:attrName>style.visibility</p:attrName>
-                                        </p:attrNameLst>
-                                      </p:cBhvr>
-                                      <p:to>
-                                        <p:strVal val="visible"/>
-                                      </p:to>
-                                    </p:set>
-                                  </p:childTnLst>
-                                </p:cTn>
-                              </p:par>
-                            </p:childTnLst>
-                          </p:cTn>
-                        </p:par>
-                      </p:childTnLst>
-                    </p:cTn>
-                  </p:par>
-                  <p:par>
-                    <p:cTn id="13" fill="hold">
-                      <p:stCondLst>
-                        <p:cond delay="indefinite"/>
-                      </p:stCondLst>
-                      <p:childTnLst>
-                        <p:par>
-                          <p:cTn id="14" fill="hold">
-                            <p:stCondLst>
-                              <p:cond delay="0"/>
-                            </p:stCondLst>
-                            <p:childTnLst>
-                              <p:par>
-                                <p:cTn id="15" presetID="1" presetClass="entr" presetSubtype="0" fill="hold" grpId="0" nodeType="clickEffect">
-                                  <p:stCondLst>
-                                    <p:cond delay="0"/>
-                                  </p:stCondLst>
-                                  <p:childTnLst>
-                                    <p:set>
-                                      <p:cBhvr>
-                                        <p:cTn id="16" dur="1" fill="hold">
-                                          <p:stCondLst>
-                                            <p:cond delay="0"/>
-                                          </p:stCondLst>
-                                        </p:cTn>
-                                        <p:tgtEl>
-                                          <p:spTgt spid="3"/>
-                                        </p:tgtEl>
-                                        <p:attrNameLst>
-                                          <p:attrName>style.visibility</p:attrName>
-                                        </p:attrNameLst>
-                                      </p:cBhvr>
-                                      <p:to>
-                                        <p:strVal val="visible"/>
-                                      </p:to>
-                                    </p:set>
-                                  </p:childTnLst>
-                                </p:cTn>
-                              </p:par>
-                              <p:par>
-                                <p:cTn id="17" presetID="1" presetClass="entr" presetSubtype="0" fill="hold" grpId="0" nodeType="withEffect">
-                                  <p:stCondLst>
-                                    <p:cond delay="0"/>
-                                  </p:stCondLst>
-                                  <p:childTnLst>
-                                    <p:set>
-                                      <p:cBhvr>
-                                        <p:cTn id="18" dur="1" fill="hold">
-                                          <p:stCondLst>
-                                            <p:cond delay="0"/>
-                                          </p:stCondLst>
-                                        </p:cTn>
-                                        <p:tgtEl>
-                                          <p:spTgt spid="7"/>
-                                        </p:tgtEl>
-                                        <p:attrNameLst>
-                                          <p:attrName>style.visibility</p:attrName>
-                                        </p:attrNameLst>
-                                      </p:cBhvr>
-                                      <p:to>
-                                        <p:strVal val="visible"/>
-                                      </p:to>
-                                    </p:set>
-                                  </p:childTnLst>
-                                </p:cTn>
-                              </p:par>
-                            </p:childTnLst>
-                          </p:cTn>
-                        </p:par>
-                      </p:childTnLst>
-                    </p:cTn>
-                  </p:par>
-                  <p:par>
-                    <p:cTn id="19" fill="hold">
-                      <p:stCondLst>
-                        <p:cond delay="indefinite"/>
-                      </p:stCondLst>
-                      <p:childTnLst>
-                        <p:par>
-                          <p:cTn id="20" fill="hold">
-                            <p:stCondLst>
-                              <p:cond delay="0"/>
-                            </p:stCondLst>
-                            <p:childTnLst>
-                              <p:par>
-                                <p:cTn id="21" presetID="1" presetClass="entr" presetSubtype="0" fill="hold" grpId="0" nodeType="clickEffect">
-                                  <p:stCondLst>
-                                    <p:cond delay="0"/>
-                                  </p:stCondLst>
-                                  <p:childTnLst>
-                                    <p:set>
-                                      <p:cBhvr>
-                                        <p:cTn id="22" dur="1" fill="hold">
-                                          <p:stCondLst>
-                                            <p:cond delay="0"/>
-                                          </p:stCondLst>
-                                        </p:cTn>
-                                        <p:tgtEl>
-                                          <p:spTgt spid="9"/>
-                                        </p:tgtEl>
-                                        <p:attrNameLst>
-                                          <p:attrName>style.visibility</p:attrName>
-                                        </p:attrNameLst>
-                                      </p:cBhvr>
-                                      <p:to>
-                                        <p:strVal val="visible"/>
-                                      </p:to>
-                                    </p:set>
-                                  </p:childTnLst>
-                                </p:cTn>
-                              </p:par>
-                            </p:childTnLst>
-                          </p:cTn>
-                        </p:par>
-                      </p:childTnLst>
-                    </p:cTn>
-                  </p:par>
-                  <p:par>
-                    <p:cTn id="23" fill="hold">
-                      <p:stCondLst>
-                        <p:cond delay="indefinite"/>
-                      </p:stCondLst>
-                      <p:childTnLst>
-                        <p:par>
-                          <p:cTn id="24" fill="hold">
-                            <p:stCondLst>
-                              <p:cond delay="0"/>
-                            </p:stCondLst>
-                            <p:childTnLst>
-                              <p:par>
-                                <p:cTn id="25" presetID="1" presetClass="entr" presetSubtype="0" fill="hold" grpId="0" nodeType="clickEffect">
-                                  <p:stCondLst>
-                                    <p:cond delay="0"/>
-                                  </p:stCondLst>
-                                  <p:childTnLst>
-                                    <p:set>
-                                      <p:cBhvr>
-                                        <p:cTn id="26" dur="1" fill="hold">
-                                          <p:stCondLst>
-                                            <p:cond delay="0"/>
-                                          </p:stCondLst>
-                                        </p:cTn>
-                                        <p:tgtEl>
-                                          <p:spTgt spid="10"/>
-                                        </p:tgtEl>
-                                        <p:attrNameLst>
-                                          <p:attrName>style.visibility</p:attrName>
-                                        </p:attrNameLst>
-                                      </p:cBhvr>
-                                      <p:to>
-                                        <p:strVal val="visible"/>
-                                      </p:to>
-                                    </p:set>
-                                  </p:childTnLst>
-                                </p:cTn>
-                              </p:par>
-                              <p:par>
-                                <p:cTn id="27" presetID="1" presetClass="entr" presetSubtype="0" fill="hold" grpId="0" nodeType="withEffect">
-                                  <p:stCondLst>
-                                    <p:cond delay="0"/>
-                                  </p:stCondLst>
-                                  <p:childTnLst>
-                                    <p:set>
-                                      <p:cBhvr>
-                                        <p:cTn id="28" dur="1" fill="hold">
-                                          <p:stCondLst>
-                                            <p:cond delay="0"/>
-                                          </p:stCondLst>
-                                        </p:cTn>
-                                        <p:tgtEl>
-                                          <p:spTgt spid="29"/>
-                                        </p:tgtEl>
-                                        <p:attrNameLst>
-                                          <p:attrName>style.visibility</p:attrName>
-                                        </p:attrNameLst>
-                                      </p:cBhvr>
-                                      <p:to>
-                                        <p:strVal val="visible"/>
-                                      </p:to>
-                                    </p:set>
-                                  </p:childTnLst>
-                                </p:cTn>
-                              </p:par>
-                            </p:childTnLst>
-                          </p:cTn>
-                        </p:par>
-                      </p:childTnLst>
-                    </p:cTn>
-                  </p:par>
-                </p:childTnLst>
-              </p:cTn>
-              <p:prevCondLst>
-                <p:cond evt="onPrev" delay="0">
-                  <p:tgtEl>
-                    <p:sldTgt/>
-                  </p:tgtEl>
-                </p:cond>
-              </p:prevCondLst>
-              <p:nextCondLst>
-                <p:cond evt="onNext" delay="0">
-                  <p:tgtEl>
-                    <p:sldTgt/>
-                  </p:tgtEl>
-                </p:cond>
-              </p:nextCondLst>
-            </p:seq>
-          </p:childTnLst>
-        </p:cTn>
-      </p:par>
-    </p:tnLst>
-    <p:bldLst>
-      <p:bldP spid="3" grpId="0" animBg="1"/>
-      <p:bldP spid="4" grpId="0" animBg="1"/>
-      <p:bldP spid="5" grpId="0"/>
-      <p:bldP spid="7" grpId="0"/>
-      <p:bldP spid="8" grpId="0" animBg="1"/>
-      <p:bldP spid="9" grpId="0" animBg="1"/>
-      <p:bldP spid="10" grpId="0" animBg="1"/>
-      <p:bldP spid="29" grpId="0"/>
-    </p:bldLst>
-  </p:timing>
 </p:sld>
 </file>
 
@@ -16375,8 +16067,8 @@
           </a:p>
         </p:txBody>
       </p:sp>
-      <mc:AlternateContent xmlns:mc="http://schemas.openxmlformats.org/markup-compatibility/2006">
-        <mc:Choice xmlns:a14="http://schemas.microsoft.com/office/drawing/2010/main" Requires="a14">
+      <mc:AlternateContent xmlns:mc="http://schemas.openxmlformats.org/markup-compatibility/2006" xmlns:a14="http://schemas.microsoft.com/office/drawing/2010/main">
+        <mc:Choice Requires="a14">
           <p:sp>
             <p:nvSpPr>
               <p:cNvPr id="3" name="TextBox 2">
@@ -16428,7 +16120,7 @@
             </p:txBody>
           </p:sp>
         </mc:Choice>
-        <mc:Fallback>
+        <mc:Fallback xmlns="">
           <p:sp>
             <p:nvSpPr>
               <p:cNvPr id="3" name="TextBox 2">
@@ -16798,8 +16490,8 @@
           </a:p>
         </p:txBody>
       </p:sp>
-      <mc:AlternateContent xmlns:mc="http://schemas.openxmlformats.org/markup-compatibility/2006">
-        <mc:Choice xmlns:a14="http://schemas.microsoft.com/office/drawing/2010/main" Requires="a14">
+      <mc:AlternateContent xmlns:mc="http://schemas.openxmlformats.org/markup-compatibility/2006" xmlns:a14="http://schemas.microsoft.com/office/drawing/2010/main">
+        <mc:Choice Requires="a14">
           <p:sp>
             <p:nvSpPr>
               <p:cNvPr id="4" name="TextBox 3">
@@ -17125,7 +16817,7 @@
             </p:txBody>
           </p:sp>
         </mc:Choice>
-        <mc:Fallback>
+        <mc:Fallback xmlns="">
           <p:sp>
             <p:nvSpPr>
               <p:cNvPr id="4" name="TextBox 3">
@@ -17211,8 +16903,8 @@
           </a:fontRef>
         </p:style>
       </p:cxnSp>
-      <mc:AlternateContent xmlns:mc="http://schemas.openxmlformats.org/markup-compatibility/2006">
-        <mc:Choice xmlns:a14="http://schemas.microsoft.com/office/drawing/2010/main" Requires="a14">
+      <mc:AlternateContent xmlns:mc="http://schemas.openxmlformats.org/markup-compatibility/2006" xmlns:a14="http://schemas.microsoft.com/office/drawing/2010/main">
+        <mc:Choice Requires="a14">
           <p:sp>
             <p:nvSpPr>
               <p:cNvPr id="6" name="TextBox 5">
@@ -17362,7 +17054,7 @@
             </p:txBody>
           </p:sp>
         </mc:Choice>
-        <mc:Fallback>
+        <mc:Fallback xmlns="">
           <p:sp>
             <p:nvSpPr>
               <p:cNvPr id="6" name="TextBox 5">
@@ -19045,8 +18737,8 @@
           </p:sp>
         </mc:Fallback>
       </mc:AlternateContent>
-      <mc:AlternateContent xmlns:mc="http://schemas.openxmlformats.org/markup-compatibility/2006">
-        <mc:Choice xmlns:a14="http://schemas.microsoft.com/office/drawing/2010/main" Requires="a14">
+      <mc:AlternateContent xmlns:mc="http://schemas.openxmlformats.org/markup-compatibility/2006" xmlns:a14="http://schemas.microsoft.com/office/drawing/2010/main">
+        <mc:Choice Requires="a14">
           <p:sp>
             <p:nvSpPr>
               <p:cNvPr id="35" name="TextBox 34">
@@ -19220,7 +18912,7 @@
             </p:txBody>
           </p:sp>
         </mc:Choice>
-        <mc:Fallback>
+        <mc:Fallback xmlns="">
           <p:sp>
             <p:nvSpPr>
               <p:cNvPr id="35" name="TextBox 34">
@@ -23514,8 +23206,8 @@
           </a:p>
         </p:txBody>
       </p:sp>
-      <mc:AlternateContent xmlns:mc="http://schemas.openxmlformats.org/markup-compatibility/2006">
-        <mc:Choice xmlns:a14="http://schemas.microsoft.com/office/drawing/2010/main" Requires="a14">
+      <mc:AlternateContent xmlns:mc="http://schemas.openxmlformats.org/markup-compatibility/2006" xmlns:a14="http://schemas.microsoft.com/office/drawing/2010/main">
+        <mc:Choice Requires="a14">
           <p:sp>
             <p:nvSpPr>
               <p:cNvPr id="36" name="TextBox 35">
@@ -23838,7 +23530,7 @@
             </p:txBody>
           </p:sp>
         </mc:Choice>
-        <mc:Fallback>
+        <mc:Fallback xmlns="">
           <p:sp>
             <p:nvSpPr>
               <p:cNvPr id="36" name="TextBox 35">
@@ -24403,8 +24095,8 @@
           <a:chExt cx="0" cy="0"/>
         </a:xfrm>
       </p:grpSpPr>
-      <mc:AlternateContent xmlns:mc="http://schemas.openxmlformats.org/markup-compatibility/2006">
-        <mc:Choice xmlns:a14="http://schemas.microsoft.com/office/drawing/2010/main" Requires="a14">
+      <mc:AlternateContent xmlns:mc="http://schemas.openxmlformats.org/markup-compatibility/2006" xmlns:a14="http://schemas.microsoft.com/office/drawing/2010/main">
+        <mc:Choice Requires="a14">
           <p:sp>
             <p:nvSpPr>
               <p:cNvPr id="2" name="TextBox 1">
@@ -25046,7 +24738,7 @@
             </p:txBody>
           </p:sp>
         </mc:Choice>
-        <mc:Fallback>
+        <mc:Fallback xmlns="">
           <p:sp>
             <p:nvSpPr>
               <p:cNvPr id="2" name="TextBox 1">
@@ -26443,8 +26135,8 @@
           </a:p>
         </p:txBody>
       </p:sp>
-      <mc:AlternateContent xmlns:mc="http://schemas.openxmlformats.org/markup-compatibility/2006">
-        <mc:Choice xmlns:a14="http://schemas.microsoft.com/office/drawing/2010/main" Requires="a14">
+      <mc:AlternateContent xmlns:mc="http://schemas.openxmlformats.org/markup-compatibility/2006" xmlns:a14="http://schemas.microsoft.com/office/drawing/2010/main">
+        <mc:Choice Requires="a14">
           <p:sp>
             <p:nvSpPr>
               <p:cNvPr id="3" name="TextBox 2">
@@ -26581,7 +26273,7 @@
             </p:txBody>
           </p:sp>
         </mc:Choice>
-        <mc:Fallback>
+        <mc:Fallback xmlns="">
           <p:sp>
             <p:nvSpPr>
               <p:cNvPr id="3" name="TextBox 2">
@@ -29098,8 +28790,8 @@
           </p:sp>
         </mc:Fallback>
       </mc:AlternateContent>
-      <mc:AlternateContent xmlns:mc="http://schemas.openxmlformats.org/markup-compatibility/2006">
-        <mc:Choice xmlns:a14="http://schemas.microsoft.com/office/drawing/2010/main" Requires="a14">
+      <mc:AlternateContent xmlns:mc="http://schemas.openxmlformats.org/markup-compatibility/2006" xmlns:a14="http://schemas.microsoft.com/office/drawing/2010/main">
+        <mc:Choice Requires="a14">
           <p:sp>
             <p:nvSpPr>
               <p:cNvPr id="35" name="TextBox 34">
@@ -29310,7 +29002,7 @@
             </p:txBody>
           </p:sp>
         </mc:Choice>
-        <mc:Fallback>
+        <mc:Fallback xmlns="">
           <p:sp>
             <p:nvSpPr>
               <p:cNvPr id="35" name="TextBox 34">
@@ -30796,8 +30488,8 @@
           </a:p>
         </p:txBody>
       </p:sp>
-      <mc:AlternateContent xmlns:mc="http://schemas.openxmlformats.org/markup-compatibility/2006">
-        <mc:Choice xmlns:a14="http://schemas.microsoft.com/office/drawing/2010/main" Requires="a14">
+      <mc:AlternateContent xmlns:mc="http://schemas.openxmlformats.org/markup-compatibility/2006" xmlns:a14="http://schemas.microsoft.com/office/drawing/2010/main">
+        <mc:Choice Requires="a14">
           <p:sp>
             <p:nvSpPr>
               <p:cNvPr id="7" name="TextBox 6">
@@ -30979,7 +30671,7 @@
             </p:txBody>
           </p:sp>
         </mc:Choice>
-        <mc:Fallback>
+        <mc:Fallback xmlns="">
           <p:sp>
             <p:nvSpPr>
               <p:cNvPr id="7" name="TextBox 6">
@@ -31024,8 +30716,8 @@
           </p:sp>
         </mc:Fallback>
       </mc:AlternateContent>
-      <mc:AlternateContent xmlns:mc="http://schemas.openxmlformats.org/markup-compatibility/2006">
-        <mc:Choice xmlns:a14="http://schemas.microsoft.com/office/drawing/2010/main" Requires="a14">
+      <mc:AlternateContent xmlns:mc="http://schemas.openxmlformats.org/markup-compatibility/2006" xmlns:a14="http://schemas.microsoft.com/office/drawing/2010/main">
+        <mc:Choice Requires="a14">
           <p:sp>
             <p:nvSpPr>
               <p:cNvPr id="2" name="TextBox 1">
@@ -31094,7 +30786,7 @@
             </p:txBody>
           </p:sp>
         </mc:Choice>
-        <mc:Fallback>
+        <mc:Fallback xmlns="">
           <p:sp>
             <p:nvSpPr>
               <p:cNvPr id="2" name="TextBox 1">
@@ -31548,8 +31240,8 @@
           </p:sp>
         </mc:Fallback>
       </mc:AlternateContent>
-      <mc:AlternateContent xmlns:mc="http://schemas.openxmlformats.org/markup-compatibility/2006">
-        <mc:Choice xmlns:a14="http://schemas.microsoft.com/office/drawing/2010/main" Requires="a14">
+      <mc:AlternateContent xmlns:mc="http://schemas.openxmlformats.org/markup-compatibility/2006" xmlns:a14="http://schemas.microsoft.com/office/drawing/2010/main">
+        <mc:Choice Requires="a14">
           <p:sp>
             <p:nvSpPr>
               <p:cNvPr id="6" name="TextBox 5">
@@ -31695,7 +31387,7 @@
             </p:txBody>
           </p:sp>
         </mc:Choice>
-        <mc:Fallback>
+        <mc:Fallback xmlns="">
           <p:sp>
             <p:nvSpPr>
               <p:cNvPr id="6" name="TextBox 5">
@@ -32378,426 +32070,6 @@
   <p:clrMapOvr>
     <a:masterClrMapping/>
   </p:clrMapOvr>
-  <p:timing>
-    <p:tnLst>
-      <p:par>
-        <p:cTn id="1" dur="indefinite" restart="never" nodeType="tmRoot">
-          <p:childTnLst>
-            <p:seq concurrent="1" nextAc="seek">
-              <p:cTn id="2" dur="indefinite" nodeType="mainSeq">
-                <p:childTnLst>
-                  <p:par>
-                    <p:cTn id="3" fill="hold">
-                      <p:stCondLst>
-                        <p:cond delay="indefinite"/>
-                      </p:stCondLst>
-                      <p:childTnLst>
-                        <p:par>
-                          <p:cTn id="4" fill="hold">
-                            <p:stCondLst>
-                              <p:cond delay="0"/>
-                            </p:stCondLst>
-                            <p:childTnLst>
-                              <p:par>
-                                <p:cTn id="5" presetID="1" presetClass="entr" presetSubtype="0" fill="hold" grpId="0" nodeType="clickEffect">
-                                  <p:stCondLst>
-                                    <p:cond delay="0"/>
-                                  </p:stCondLst>
-                                  <p:childTnLst>
-                                    <p:set>
-                                      <p:cBhvr>
-                                        <p:cTn id="6" dur="1" fill="hold">
-                                          <p:stCondLst>
-                                            <p:cond delay="0"/>
-                                          </p:stCondLst>
-                                        </p:cTn>
-                                        <p:tgtEl>
-                                          <p:spTgt spid="4"/>
-                                        </p:tgtEl>
-                                        <p:attrNameLst>
-                                          <p:attrName>style.visibility</p:attrName>
-                                        </p:attrNameLst>
-                                      </p:cBhvr>
-                                      <p:to>
-                                        <p:strVal val="visible"/>
-                                      </p:to>
-                                    </p:set>
-                                  </p:childTnLst>
-                                </p:cTn>
-                              </p:par>
-                              <p:par>
-                                <p:cTn id="7" presetID="1" presetClass="entr" presetSubtype="0" fill="hold" grpId="0" nodeType="withEffect">
-                                  <p:stCondLst>
-                                    <p:cond delay="0"/>
-                                  </p:stCondLst>
-                                  <p:childTnLst>
-                                    <p:set>
-                                      <p:cBhvr>
-                                        <p:cTn id="8" dur="1" fill="hold">
-                                          <p:stCondLst>
-                                            <p:cond delay="0"/>
-                                          </p:stCondLst>
-                                        </p:cTn>
-                                        <p:tgtEl>
-                                          <p:spTgt spid="5"/>
-                                        </p:tgtEl>
-                                        <p:attrNameLst>
-                                          <p:attrName>style.visibility</p:attrName>
-                                        </p:attrNameLst>
-                                      </p:cBhvr>
-                                      <p:to>
-                                        <p:strVal val="visible"/>
-                                      </p:to>
-                                    </p:set>
-                                  </p:childTnLst>
-                                </p:cTn>
-                              </p:par>
-                            </p:childTnLst>
-                          </p:cTn>
-                        </p:par>
-                      </p:childTnLst>
-                    </p:cTn>
-                  </p:par>
-                  <p:par>
-                    <p:cTn id="9" fill="hold">
-                      <p:stCondLst>
-                        <p:cond delay="indefinite"/>
-                      </p:stCondLst>
-                      <p:childTnLst>
-                        <p:par>
-                          <p:cTn id="10" fill="hold">
-                            <p:stCondLst>
-                              <p:cond delay="0"/>
-                            </p:stCondLst>
-                            <p:childTnLst>
-                              <p:par>
-                                <p:cTn id="11" presetID="1" presetClass="entr" presetSubtype="0" fill="hold" grpId="0" nodeType="clickEffect">
-                                  <p:stCondLst>
-                                    <p:cond delay="0"/>
-                                  </p:stCondLst>
-                                  <p:childTnLst>
-                                    <p:set>
-                                      <p:cBhvr>
-                                        <p:cTn id="12" dur="1" fill="hold">
-                                          <p:stCondLst>
-                                            <p:cond delay="0"/>
-                                          </p:stCondLst>
-                                        </p:cTn>
-                                        <p:tgtEl>
-                                          <p:spTgt spid="11"/>
-                                        </p:tgtEl>
-                                        <p:attrNameLst>
-                                          <p:attrName>style.visibility</p:attrName>
-                                        </p:attrNameLst>
-                                      </p:cBhvr>
-                                      <p:to>
-                                        <p:strVal val="visible"/>
-                                      </p:to>
-                                    </p:set>
-                                  </p:childTnLst>
-                                </p:cTn>
-                              </p:par>
-                              <p:par>
-                                <p:cTn id="13" presetID="1" presetClass="entr" presetSubtype="0" fill="hold" grpId="0" nodeType="withEffect">
-                                  <p:stCondLst>
-                                    <p:cond delay="0"/>
-                                  </p:stCondLst>
-                                  <p:childTnLst>
-                                    <p:set>
-                                      <p:cBhvr>
-                                        <p:cTn id="14" dur="1" fill="hold">
-                                          <p:stCondLst>
-                                            <p:cond delay="0"/>
-                                          </p:stCondLst>
-                                        </p:cTn>
-                                        <p:tgtEl>
-                                          <p:spTgt spid="6"/>
-                                        </p:tgtEl>
-                                        <p:attrNameLst>
-                                          <p:attrName>style.visibility</p:attrName>
-                                        </p:attrNameLst>
-                                      </p:cBhvr>
-                                      <p:to>
-                                        <p:strVal val="visible"/>
-                                      </p:to>
-                                    </p:set>
-                                  </p:childTnLst>
-                                </p:cTn>
-                              </p:par>
-                            </p:childTnLst>
-                          </p:cTn>
-                        </p:par>
-                      </p:childTnLst>
-                    </p:cTn>
-                  </p:par>
-                  <p:par>
-                    <p:cTn id="15" fill="hold">
-                      <p:stCondLst>
-                        <p:cond delay="indefinite"/>
-                      </p:stCondLst>
-                      <p:childTnLst>
-                        <p:par>
-                          <p:cTn id="16" fill="hold">
-                            <p:stCondLst>
-                              <p:cond delay="0"/>
-                            </p:stCondLst>
-                            <p:childTnLst>
-                              <p:par>
-                                <p:cTn id="17" presetID="1" presetClass="entr" presetSubtype="0" fill="hold" grpId="0" nodeType="clickEffect">
-                                  <p:stCondLst>
-                                    <p:cond delay="0"/>
-                                  </p:stCondLst>
-                                  <p:childTnLst>
-                                    <p:set>
-                                      <p:cBhvr>
-                                        <p:cTn id="18" dur="1" fill="hold">
-                                          <p:stCondLst>
-                                            <p:cond delay="0"/>
-                                          </p:stCondLst>
-                                        </p:cTn>
-                                        <p:tgtEl>
-                                          <p:spTgt spid="8"/>
-                                        </p:tgtEl>
-                                        <p:attrNameLst>
-                                          <p:attrName>style.visibility</p:attrName>
-                                        </p:attrNameLst>
-                                      </p:cBhvr>
-                                      <p:to>
-                                        <p:strVal val="visible"/>
-                                      </p:to>
-                                    </p:set>
-                                  </p:childTnLst>
-                                </p:cTn>
-                              </p:par>
-                            </p:childTnLst>
-                          </p:cTn>
-                        </p:par>
-                      </p:childTnLst>
-                    </p:cTn>
-                  </p:par>
-                  <p:par>
-                    <p:cTn id="19" fill="hold">
-                      <p:stCondLst>
-                        <p:cond delay="indefinite"/>
-                      </p:stCondLst>
-                      <p:childTnLst>
-                        <p:par>
-                          <p:cTn id="20" fill="hold">
-                            <p:stCondLst>
-                              <p:cond delay="0"/>
-                            </p:stCondLst>
-                            <p:childTnLst>
-                              <p:par>
-                                <p:cTn id="21" presetID="1" presetClass="entr" presetSubtype="0" fill="hold" grpId="0" nodeType="clickEffect">
-                                  <p:stCondLst>
-                                    <p:cond delay="0"/>
-                                  </p:stCondLst>
-                                  <p:childTnLst>
-                                    <p:set>
-                                      <p:cBhvr>
-                                        <p:cTn id="22" dur="1" fill="hold">
-                                          <p:stCondLst>
-                                            <p:cond delay="0"/>
-                                          </p:stCondLst>
-                                        </p:cTn>
-                                        <p:tgtEl>
-                                          <p:spTgt spid="3"/>
-                                        </p:tgtEl>
-                                        <p:attrNameLst>
-                                          <p:attrName>style.visibility</p:attrName>
-                                        </p:attrNameLst>
-                                      </p:cBhvr>
-                                      <p:to>
-                                        <p:strVal val="visible"/>
-                                      </p:to>
-                                    </p:set>
-                                  </p:childTnLst>
-                                </p:cTn>
-                              </p:par>
-                              <p:par>
-                                <p:cTn id="23" presetID="1" presetClass="entr" presetSubtype="0" fill="hold" grpId="0" nodeType="withEffect">
-                                  <p:stCondLst>
-                                    <p:cond delay="0"/>
-                                  </p:stCondLst>
-                                  <p:childTnLst>
-                                    <p:set>
-                                      <p:cBhvr>
-                                        <p:cTn id="24" dur="1" fill="hold">
-                                          <p:stCondLst>
-                                            <p:cond delay="0"/>
-                                          </p:stCondLst>
-                                        </p:cTn>
-                                        <p:tgtEl>
-                                          <p:spTgt spid="7"/>
-                                        </p:tgtEl>
-                                        <p:attrNameLst>
-                                          <p:attrName>style.visibility</p:attrName>
-                                        </p:attrNameLst>
-                                      </p:cBhvr>
-                                      <p:to>
-                                        <p:strVal val="visible"/>
-                                      </p:to>
-                                    </p:set>
-                                  </p:childTnLst>
-                                </p:cTn>
-                              </p:par>
-                            </p:childTnLst>
-                          </p:cTn>
-                        </p:par>
-                      </p:childTnLst>
-                    </p:cTn>
-                  </p:par>
-                  <p:par>
-                    <p:cTn id="25" fill="hold">
-                      <p:stCondLst>
-                        <p:cond delay="indefinite"/>
-                      </p:stCondLst>
-                      <p:childTnLst>
-                        <p:par>
-                          <p:cTn id="26" fill="hold">
-                            <p:stCondLst>
-                              <p:cond delay="0"/>
-                            </p:stCondLst>
-                            <p:childTnLst>
-                              <p:par>
-                                <p:cTn id="27" presetID="1" presetClass="entr" presetSubtype="0" fill="hold" grpId="0" nodeType="clickEffect">
-                                  <p:stCondLst>
-                                    <p:cond delay="0"/>
-                                  </p:stCondLst>
-                                  <p:childTnLst>
-                                    <p:set>
-                                      <p:cBhvr>
-                                        <p:cTn id="28" dur="1" fill="hold">
-                                          <p:stCondLst>
-                                            <p:cond delay="0"/>
-                                          </p:stCondLst>
-                                        </p:cTn>
-                                        <p:tgtEl>
-                                          <p:spTgt spid="9"/>
-                                        </p:tgtEl>
-                                        <p:attrNameLst>
-                                          <p:attrName>style.visibility</p:attrName>
-                                        </p:attrNameLst>
-                                      </p:cBhvr>
-                                      <p:to>
-                                        <p:strVal val="visible"/>
-                                      </p:to>
-                                    </p:set>
-                                  </p:childTnLst>
-                                </p:cTn>
-                              </p:par>
-                            </p:childTnLst>
-                          </p:cTn>
-                        </p:par>
-                      </p:childTnLst>
-                    </p:cTn>
-                  </p:par>
-                  <p:par>
-                    <p:cTn id="29" fill="hold">
-                      <p:stCondLst>
-                        <p:cond delay="indefinite"/>
-                      </p:stCondLst>
-                      <p:childTnLst>
-                        <p:par>
-                          <p:cTn id="30" fill="hold">
-                            <p:stCondLst>
-                              <p:cond delay="0"/>
-                            </p:stCondLst>
-                            <p:childTnLst>
-                              <p:par>
-                                <p:cTn id="31" presetID="1" presetClass="entr" presetSubtype="0" fill="hold" grpId="0" nodeType="clickEffect">
-                                  <p:stCondLst>
-                                    <p:cond delay="0"/>
-                                  </p:stCondLst>
-                                  <p:childTnLst>
-                                    <p:set>
-                                      <p:cBhvr>
-                                        <p:cTn id="32" dur="1" fill="hold">
-                                          <p:stCondLst>
-                                            <p:cond delay="0"/>
-                                          </p:stCondLst>
-                                        </p:cTn>
-                                        <p:tgtEl>
-                                          <p:spTgt spid="10"/>
-                                        </p:tgtEl>
-                                        <p:attrNameLst>
-                                          <p:attrName>style.visibility</p:attrName>
-                                        </p:attrNameLst>
-                                      </p:cBhvr>
-                                      <p:to>
-                                        <p:strVal val="visible"/>
-                                      </p:to>
-                                    </p:set>
-                                  </p:childTnLst>
-                                </p:cTn>
-                              </p:par>
-                              <p:par>
-                                <p:cTn id="33" presetID="1" presetClass="entr" presetSubtype="0" fill="hold" grpId="0" nodeType="withEffect">
-                                  <p:stCondLst>
-                                    <p:cond delay="0"/>
-                                  </p:stCondLst>
-                                  <p:childTnLst>
-                                    <p:set>
-                                      <p:cBhvr>
-                                        <p:cTn id="34" dur="1" fill="hold">
-                                          <p:stCondLst>
-                                            <p:cond delay="0"/>
-                                          </p:stCondLst>
-                                        </p:cTn>
-                                        <p:tgtEl>
-                                          <p:spTgt spid="29"/>
-                                        </p:tgtEl>
-                                        <p:attrNameLst>
-                                          <p:attrName>style.visibility</p:attrName>
-                                        </p:attrNameLst>
-                                      </p:cBhvr>
-                                      <p:to>
-                                        <p:strVal val="visible"/>
-                                      </p:to>
-                                    </p:set>
-                                  </p:childTnLst>
-                                </p:cTn>
-                              </p:par>
-                            </p:childTnLst>
-                          </p:cTn>
-                        </p:par>
-                      </p:childTnLst>
-                    </p:cTn>
-                  </p:par>
-                </p:childTnLst>
-              </p:cTn>
-              <p:prevCondLst>
-                <p:cond evt="onPrev" delay="0">
-                  <p:tgtEl>
-                    <p:sldTgt/>
-                  </p:tgtEl>
-                </p:cond>
-              </p:prevCondLst>
-              <p:nextCondLst>
-                <p:cond evt="onNext" delay="0">
-                  <p:tgtEl>
-                    <p:sldTgt/>
-                  </p:tgtEl>
-                </p:cond>
-              </p:nextCondLst>
-            </p:seq>
-          </p:childTnLst>
-        </p:cTn>
-      </p:par>
-    </p:tnLst>
-    <p:bldLst>
-      <p:bldP spid="3" grpId="0" animBg="1"/>
-      <p:bldP spid="4" grpId="0" animBg="1"/>
-      <p:bldP spid="5" grpId="0"/>
-      <p:bldP spid="6" grpId="0"/>
-      <p:bldP spid="7" grpId="0"/>
-      <p:bldP spid="8" grpId="0" animBg="1"/>
-      <p:bldP spid="9" grpId="0" animBg="1"/>
-      <p:bldP spid="10" grpId="0" animBg="1"/>
-      <p:bldP spid="11" grpId="0"/>
-      <p:bldP spid="29" grpId="0"/>
-    </p:bldLst>
-  </p:timing>
 </p:sld>
 </file>
 

</xml_diff>